<commit_message>
Added revised material on persistency
Revised chapter (web service taken out), and exercises using EF Core.
</commit_message>
<xml_diff>
--- a/Chap/DB/Presentations/DBRelationalModel.pptx
+++ b/Chap/DB/Presentations/DBRelationalModel.pptx
@@ -292,7 +292,7 @@
           <a:p>
             <a:fld id="{E15B7D8E-2A20-4C0E-991C-872DBB7459A8}" type="datetimeFigureOut">
               <a:rPr lang="da-DK" smtClean="0"/>
-              <a:t>29-09-2018</a:t>
+              <a:t>04-10-2018</a:t>
             </a:fld>
             <a:endParaRPr lang="da-DK"/>
           </a:p>
@@ -462,7 +462,7 @@
           <a:p>
             <a:fld id="{E15B7D8E-2A20-4C0E-991C-872DBB7459A8}" type="datetimeFigureOut">
               <a:rPr lang="da-DK" smtClean="0"/>
-              <a:t>29-09-2018</a:t>
+              <a:t>04-10-2018</a:t>
             </a:fld>
             <a:endParaRPr lang="da-DK"/>
           </a:p>
@@ -642,7 +642,7 @@
           <a:p>
             <a:fld id="{E15B7D8E-2A20-4C0E-991C-872DBB7459A8}" type="datetimeFigureOut">
               <a:rPr lang="da-DK" smtClean="0"/>
-              <a:t>29-09-2018</a:t>
+              <a:t>04-10-2018</a:t>
             </a:fld>
             <a:endParaRPr lang="da-DK"/>
           </a:p>
@@ -812,7 +812,7 @@
           <a:p>
             <a:fld id="{E15B7D8E-2A20-4C0E-991C-872DBB7459A8}" type="datetimeFigureOut">
               <a:rPr lang="da-DK" smtClean="0"/>
-              <a:t>29-09-2018</a:t>
+              <a:t>04-10-2018</a:t>
             </a:fld>
             <a:endParaRPr lang="da-DK"/>
           </a:p>
@@ -1058,7 +1058,7 @@
           <a:p>
             <a:fld id="{E15B7D8E-2A20-4C0E-991C-872DBB7459A8}" type="datetimeFigureOut">
               <a:rPr lang="da-DK" smtClean="0"/>
-              <a:t>29-09-2018</a:t>
+              <a:t>04-10-2018</a:t>
             </a:fld>
             <a:endParaRPr lang="da-DK"/>
           </a:p>
@@ -1290,7 +1290,7 @@
           <a:p>
             <a:fld id="{E15B7D8E-2A20-4C0E-991C-872DBB7459A8}" type="datetimeFigureOut">
               <a:rPr lang="da-DK" smtClean="0"/>
-              <a:t>29-09-2018</a:t>
+              <a:t>04-10-2018</a:t>
             </a:fld>
             <a:endParaRPr lang="da-DK"/>
           </a:p>
@@ -1657,7 +1657,7 @@
           <a:p>
             <a:fld id="{E15B7D8E-2A20-4C0E-991C-872DBB7459A8}" type="datetimeFigureOut">
               <a:rPr lang="da-DK" smtClean="0"/>
-              <a:t>29-09-2018</a:t>
+              <a:t>04-10-2018</a:t>
             </a:fld>
             <a:endParaRPr lang="da-DK"/>
           </a:p>
@@ -1775,7 +1775,7 @@
           <a:p>
             <a:fld id="{E15B7D8E-2A20-4C0E-991C-872DBB7459A8}" type="datetimeFigureOut">
               <a:rPr lang="da-DK" smtClean="0"/>
-              <a:t>29-09-2018</a:t>
+              <a:t>04-10-2018</a:t>
             </a:fld>
             <a:endParaRPr lang="da-DK"/>
           </a:p>
@@ -1870,7 +1870,7 @@
           <a:p>
             <a:fld id="{E15B7D8E-2A20-4C0E-991C-872DBB7459A8}" type="datetimeFigureOut">
               <a:rPr lang="da-DK" smtClean="0"/>
-              <a:t>29-09-2018</a:t>
+              <a:t>04-10-2018</a:t>
             </a:fld>
             <a:endParaRPr lang="da-DK"/>
           </a:p>
@@ -2147,7 +2147,7 @@
           <a:p>
             <a:fld id="{E15B7D8E-2A20-4C0E-991C-872DBB7459A8}" type="datetimeFigureOut">
               <a:rPr lang="da-DK" smtClean="0"/>
-              <a:t>29-09-2018</a:t>
+              <a:t>04-10-2018</a:t>
             </a:fld>
             <a:endParaRPr lang="da-DK"/>
           </a:p>
@@ -2400,7 +2400,7 @@
           <a:p>
             <a:fld id="{E15B7D8E-2A20-4C0E-991C-872DBB7459A8}" type="datetimeFigureOut">
               <a:rPr lang="da-DK" smtClean="0"/>
-              <a:t>29-09-2018</a:t>
+              <a:t>04-10-2018</a:t>
             </a:fld>
             <a:endParaRPr lang="da-DK"/>
           </a:p>
@@ -2613,7 +2613,7 @@
           <a:p>
             <a:fld id="{E15B7D8E-2A20-4C0E-991C-872DBB7459A8}" type="datetimeFigureOut">
               <a:rPr lang="da-DK" smtClean="0"/>
-              <a:t>29-09-2018</a:t>
+              <a:t>04-10-2018</a:t>
             </a:fld>
             <a:endParaRPr lang="da-DK"/>
           </a:p>
@@ -6102,7 +6102,7 @@
           <p:nvPr>
             <p:extLst>
               <p:ext uri="{D42A27DB-BD31-4B8C-83A1-F6EECF244321}">
-                <p14:modId xmlns:p14="http://schemas.microsoft.com/office/powerpoint/2010/main" val="2498776126"/>
+                <p14:modId xmlns:p14="http://schemas.microsoft.com/office/powerpoint/2010/main" val="535883433"/>
               </p:ext>
             </p:extLst>
           </p:nvPr>
@@ -6405,7 +6405,7 @@
                     <a:p>
                       <a:r>
                         <a:rPr lang="da-DK" sz="1800" b="1" smtClean="0"/>
-                        <a:t>restaurant_name</a:t>
+                        <a:t>city</a:t>
                       </a:r>
                       <a:endParaRPr lang="da-DK" sz="1800" b="1"/>
                     </a:p>
@@ -9510,7 +9510,7 @@
           <p:nvPr>
             <p:extLst>
               <p:ext uri="{D42A27DB-BD31-4B8C-83A1-F6EECF244321}">
-                <p14:modId xmlns:p14="http://schemas.microsoft.com/office/powerpoint/2010/main" val="2516353970"/>
+                <p14:modId xmlns:p14="http://schemas.microsoft.com/office/powerpoint/2010/main" val="608053784"/>
               </p:ext>
             </p:extLst>
           </p:nvPr>
@@ -9813,7 +9813,7 @@
                     <a:p>
                       <a:r>
                         <a:rPr lang="da-DK" sz="1200" b="1" smtClean="0"/>
-                        <a:t>restaurant_name</a:t>
+                        <a:t>city</a:t>
                       </a:r>
                       <a:endParaRPr lang="da-DK" sz="1200" b="1"/>
                     </a:p>
@@ -10990,13 +10990,13 @@
   <p:clrMapOvr>
     <a:masterClrMapping/>
   </p:clrMapOvr>
-  <mc:AlternateContent xmlns:mc="http://schemas.openxmlformats.org/markup-compatibility/2006">
-    <mc:Choice xmlns:p14="http://schemas.microsoft.com/office/powerpoint/2010/main" Requires="p14">
+  <mc:AlternateContent xmlns:mc="http://schemas.openxmlformats.org/markup-compatibility/2006" xmlns:p14="http://schemas.microsoft.com/office/powerpoint/2010/main">
+    <mc:Choice Requires="p14">
       <p:transition spd="med" p14:dur="700">
         <p:fade/>
       </p:transition>
     </mc:Choice>
-    <mc:Fallback>
+    <mc:Fallback xmlns="">
       <p:transition spd="med">
         <p:fade/>
       </p:transition>
@@ -11096,11 +11096,7 @@
             </a:r>
             <a:r>
               <a:rPr lang="da-DK" sz="2800" smtClean="0"/>
-              <a:t> </a:t>
-            </a:r>
-            <a:r>
-              <a:rPr lang="da-DK" sz="2800" smtClean="0"/>
-              <a:t>(</a:t>
+              <a:t> (</a:t>
             </a:r>
             <a:r>
               <a:rPr lang="da-DK" sz="2800" b="1" smtClean="0"/>
@@ -23920,7 +23916,7 @@
           <p:nvPr>
             <p:extLst>
               <p:ext uri="{D42A27DB-BD31-4B8C-83A1-F6EECF244321}">
-                <p14:modId xmlns:p14="http://schemas.microsoft.com/office/powerpoint/2010/main" val="3502762435"/>
+                <p14:modId xmlns:p14="http://schemas.microsoft.com/office/powerpoint/2010/main" val="1955057218"/>
               </p:ext>
             </p:extLst>
           </p:nvPr>
@@ -24228,7 +24224,7 @@
                     <a:p>
                       <a:r>
                         <a:rPr lang="da-DK" sz="1800" b="1" smtClean="0"/>
-                        <a:t>restaurant_name</a:t>
+                        <a:t>city</a:t>
                       </a:r>
                       <a:endParaRPr lang="da-DK" sz="1800" b="1"/>
                     </a:p>
@@ -25655,15 +25651,7 @@
             </a:r>
             <a:r>
               <a:rPr lang="da-DK" sz="3200" smtClean="0"/>
-              <a:t> of the two </a:t>
-            </a:r>
-            <a:r>
-              <a:rPr lang="da-DK" sz="3200" smtClean="0"/>
-              <a:t>columns </a:t>
-            </a:r>
-            <a:r>
-              <a:rPr lang="da-DK" sz="3200" smtClean="0"/>
-              <a:t>which is unique (</a:t>
+              <a:t> of the two columns which is unique (</a:t>
             </a:r>
             <a:r>
               <a:rPr lang="da-DK" sz="3200" i="1" smtClean="0"/>
@@ -26472,11 +26460,7 @@
             <a:pPr lvl="0"/>
             <a:r>
               <a:rPr lang="da-DK" sz="3200" smtClean="0"/>
-              <a:t>The key </a:t>
-            </a:r>
-            <a:r>
-              <a:rPr lang="da-DK" sz="3200" smtClean="0"/>
-              <a:t>(</a:t>
+              <a:t>The key (</a:t>
             </a:r>
             <a:r>
               <a:rPr lang="da-DK" sz="3200" b="1" smtClean="0"/>
@@ -26492,11 +26476,7 @@
             </a:r>
             <a:r>
               <a:rPr lang="da-DK" sz="3200" smtClean="0"/>
-              <a:t>) </a:t>
-            </a:r>
-            <a:r>
-              <a:rPr lang="da-DK" sz="3200" smtClean="0"/>
-              <a:t>is a </a:t>
+              <a:t>) is a </a:t>
             </a:r>
             <a:r>
               <a:rPr lang="da-DK" sz="3200" b="1" smtClean="0"/>
@@ -26530,11 +26510,7 @@
             </a:r>
             <a:r>
               <a:rPr lang="da-DK" sz="3200" smtClean="0"/>
-              <a:t> </a:t>
-            </a:r>
-            <a:r>
-              <a:rPr lang="da-DK" sz="3200" smtClean="0"/>
-              <a:t>and </a:t>
+              <a:t> and </a:t>
             </a:r>
             <a:r>
               <a:rPr lang="da-DK" sz="3200" b="1" smtClean="0"/>
@@ -26542,19 +26518,11 @@
             </a:r>
             <a:r>
               <a:rPr lang="da-DK" sz="3200" smtClean="0"/>
-              <a:t>are – in the context of this table </a:t>
-            </a:r>
-            <a:r>
-              <a:rPr lang="da-DK" sz="3200" smtClean="0"/>
-              <a:t>– </a:t>
+              <a:t>are – in the context of this table – </a:t>
             </a:r>
             <a:r>
               <a:rPr lang="da-DK" sz="3200" b="1" smtClean="0"/>
-              <a:t>foreign </a:t>
-            </a:r>
-            <a:r>
-              <a:rPr lang="da-DK" sz="3200" b="1" smtClean="0"/>
-              <a:t>keys</a:t>
+              <a:t>foreign keys</a:t>
             </a:r>
             <a:r>
               <a:rPr lang="da-DK" sz="3200" smtClean="0"/>
@@ -27828,7 +27796,7 @@
           <p:nvPr>
             <p:extLst>
               <p:ext uri="{D42A27DB-BD31-4B8C-83A1-F6EECF244321}">
-                <p14:modId xmlns:p14="http://schemas.microsoft.com/office/powerpoint/2010/main" val="2891684125"/>
+                <p14:modId xmlns:p14="http://schemas.microsoft.com/office/powerpoint/2010/main" val="3524643876"/>
               </p:ext>
             </p:extLst>
           </p:nvPr>
@@ -28005,7 +27973,7 @@
                     <a:p>
                       <a:r>
                         <a:rPr lang="da-DK" sz="1800" smtClean="0"/>
-                        <a:t>restaurant_name</a:t>
+                        <a:t>city</a:t>
                       </a:r>
                       <a:endParaRPr lang="da-DK" sz="1800"/>
                     </a:p>
@@ -29424,19 +29392,11 @@
             </a:r>
             <a:r>
               <a:rPr lang="da-DK" sz="3200" b="1" smtClean="0"/>
-              <a:t>r</a:t>
-            </a:r>
-            <a:r>
-              <a:rPr lang="da-DK" sz="3200" b="1" smtClean="0"/>
-              <a:t>estaurant_id</a:t>
+              <a:t>restaurant_id</a:t>
             </a:r>
             <a:r>
               <a:rPr lang="da-DK" sz="3200" smtClean="0"/>
-              <a:t> </a:t>
-            </a:r>
-            <a:r>
-              <a:rPr lang="da-DK" sz="3200" smtClean="0"/>
-              <a:t>column to the </a:t>
+              <a:t> column to the </a:t>
             </a:r>
             <a:r>
               <a:rPr lang="da-DK" sz="3200" b="1" smtClean="0"/>
@@ -31452,11 +31412,7 @@
             </a:r>
             <a:r>
               <a:rPr lang="da-DK" sz="3200" b="1" smtClean="0"/>
-              <a:t>primary </a:t>
-            </a:r>
-            <a:r>
-              <a:rPr lang="da-DK" sz="3200" b="1" smtClean="0"/>
-              <a:t>key </a:t>
+              <a:t>primary key </a:t>
             </a:r>
             <a:r>
               <a:rPr lang="da-DK" sz="3200" smtClean="0"/>
@@ -31468,11 +31424,7 @@
             </a:r>
             <a:r>
               <a:rPr lang="da-DK" sz="3200" smtClean="0"/>
-              <a:t>in </a:t>
-            </a:r>
-            <a:r>
-              <a:rPr lang="da-DK" sz="3200" smtClean="0"/>
-              <a:t>the  </a:t>
+              <a:t>in the  </a:t>
             </a:r>
             <a:r>
               <a:rPr lang="da-DK" sz="3200" b="1" smtClean="0"/>
@@ -31494,7 +31446,7 @@
           <p:nvPr>
             <p:extLst>
               <p:ext uri="{D42A27DB-BD31-4B8C-83A1-F6EECF244321}">
-                <p14:modId xmlns:p14="http://schemas.microsoft.com/office/powerpoint/2010/main" val="898852833"/>
+                <p14:modId xmlns:p14="http://schemas.microsoft.com/office/powerpoint/2010/main" val="1646351494"/>
               </p:ext>
             </p:extLst>
           </p:nvPr>
@@ -31802,7 +31754,7 @@
                     <a:p>
                       <a:r>
                         <a:rPr lang="da-DK" sz="1800" b="1" smtClean="0"/>
-                        <a:t>restaurant_name</a:t>
+                        <a:t>city</a:t>
                       </a:r>
                       <a:endParaRPr lang="da-DK" sz="1800" b="1"/>
                     </a:p>
@@ -32681,19 +32633,11 @@
             </a:r>
             <a:r>
               <a:rPr lang="da-DK" sz="3200" b="1" smtClean="0"/>
-              <a:t>r</a:t>
-            </a:r>
-            <a:r>
-              <a:rPr lang="da-DK" sz="3200" b="1" smtClean="0"/>
-              <a:t>estaurant_id</a:t>
+              <a:t>restaurant_id</a:t>
             </a:r>
             <a:r>
               <a:rPr lang="da-DK" sz="3200" smtClean="0"/>
-              <a:t> </a:t>
-            </a:r>
-            <a:r>
-              <a:rPr lang="da-DK" sz="3200" smtClean="0"/>
-              <a:t>in </a:t>
+              <a:t> in </a:t>
             </a:r>
             <a:r>
               <a:rPr lang="da-DK" sz="3200" b="1" smtClean="0"/>
@@ -32709,11 +32653,7 @@
             </a:r>
             <a:r>
               <a:rPr lang="da-DK" sz="3200" smtClean="0"/>
-              <a:t> </a:t>
-            </a:r>
-            <a:r>
-              <a:rPr lang="da-DK" sz="3200" smtClean="0"/>
-              <a:t>in </a:t>
+              <a:t> in </a:t>
             </a:r>
             <a:r>
               <a:rPr lang="da-DK" sz="3200" b="1" smtClean="0"/>
@@ -36871,7 +36811,7 @@
           <p:nvPr>
             <p:extLst>
               <p:ext uri="{D42A27DB-BD31-4B8C-83A1-F6EECF244321}">
-                <p14:modId xmlns:p14="http://schemas.microsoft.com/office/powerpoint/2010/main" val="3478642644"/>
+                <p14:modId xmlns:p14="http://schemas.microsoft.com/office/powerpoint/2010/main" val="2530525613"/>
               </p:ext>
             </p:extLst>
           </p:nvPr>
@@ -37179,7 +37119,7 @@
                     <a:p>
                       <a:r>
                         <a:rPr lang="da-DK" sz="1800" b="1" smtClean="0"/>
-                        <a:t>restaurant_name</a:t>
+                        <a:t>city</a:t>
                       </a:r>
                       <a:endParaRPr lang="da-DK" sz="1800" b="1"/>
                     </a:p>
@@ -37867,11 +37807,7 @@
             </a:r>
             <a:r>
               <a:rPr lang="da-DK" sz="3200" smtClean="0"/>
-              <a:t> </a:t>
-            </a:r>
-            <a:r>
-              <a:rPr lang="da-DK" sz="3200" smtClean="0"/>
-              <a:t>= 3…</a:t>
+              <a:t> = 3…</a:t>
             </a:r>
           </a:p>
         </p:txBody>
@@ -37885,7 +37821,7 @@
           <p:nvPr>
             <p:extLst>
               <p:ext uri="{D42A27DB-BD31-4B8C-83A1-F6EECF244321}">
-                <p14:modId xmlns:p14="http://schemas.microsoft.com/office/powerpoint/2010/main" val="4009252295"/>
+                <p14:modId xmlns:p14="http://schemas.microsoft.com/office/powerpoint/2010/main" val="4158280842"/>
               </p:ext>
             </p:extLst>
           </p:nvPr>
@@ -38193,7 +38129,7 @@
                     <a:p>
                       <a:r>
                         <a:rPr lang="da-DK" sz="1800" b="1" smtClean="0"/>
-                        <a:t>restaurant_name</a:t>
+                        <a:t>city</a:t>
                       </a:r>
                       <a:endParaRPr lang="da-DK" sz="1800" b="1"/>
                     </a:p>
@@ -38691,11 +38627,7 @@
             </a:r>
             <a:r>
               <a:rPr lang="da-DK" sz="3200" smtClean="0"/>
-              <a:t> </a:t>
-            </a:r>
-            <a:r>
-              <a:rPr lang="da-DK" sz="3200" smtClean="0"/>
-              <a:t>= 3, we must</a:t>
+              <a:t> = 3, we must</a:t>
             </a:r>
           </a:p>
           <a:p>
@@ -38706,11 +38638,7 @@
             </a:r>
             <a:r>
               <a:rPr lang="da-DK" sz="2800" b="1" smtClean="0"/>
-              <a:t>r</a:t>
-            </a:r>
-            <a:r>
-              <a:rPr lang="da-DK" sz="2800" b="1" smtClean="0"/>
-              <a:t>estaurant_id </a:t>
+              <a:t>restaurant_id </a:t>
             </a:r>
             <a:r>
               <a:rPr lang="da-DK" sz="2800" smtClean="0"/>
@@ -42205,11 +42133,7 @@
             </a:r>
             <a:r>
               <a:rPr lang="da-DK" sz="3200" smtClean="0"/>
-              <a:t>– define new column which will act as primary key (typically </a:t>
-            </a:r>
-            <a:r>
-              <a:rPr lang="da-DK" sz="3200" smtClean="0"/>
-              <a:t>just named </a:t>
+              <a:t>– define new column which will act as primary key (typically just named </a:t>
             </a:r>
             <a:r>
               <a:rPr lang="da-DK" sz="3200" b="1" smtClean="0"/>
@@ -42227,7 +42151,6 @@
               <a:rPr lang="da-DK" sz="3200" smtClean="0"/>
               <a:t>)</a:t>
             </a:r>
-            <a:endParaRPr lang="da-DK" sz="3200" smtClean="0"/>
           </a:p>
           <a:p>
             <a:r>
@@ -42315,7 +42238,11 @@
             </a:r>
             <a:r>
               <a:rPr lang="da-DK" b="1" smtClean="0"/>
-              <a:t>Model – Structural</a:t>
+              <a:t>Model – </a:t>
+            </a:r>
+            <a:r>
+              <a:rPr lang="da-DK" b="1" smtClean="0"/>
+              <a:t>Structural (definitions)</a:t>
             </a:r>
             <a:endParaRPr lang="da-DK" b="1"/>
           </a:p>

</xml_diff>